<commit_message>
changed BNG-u to BNG-d
</commit_message>
<xml_diff>
--- a/docs/whitepaper/imgsrc/whitepaper_diagrams.pptx
+++ b/docs/whitepaper/imgsrc/whitepaper_diagrams.pptx
@@ -34900,10 +34900,10 @@
               <a:buNone/>
             </a:pPr>
             <a:r>
-              <a:rPr lang="en-US"/>
-              <a:t>BNG-u</a:t>
+              <a:rPr lang="en-US" dirty="0"/>
+              <a:t>BNG-d</a:t>
             </a:r>
-            <a:endParaRPr/>
+            <a:endParaRPr dirty="0"/>
           </a:p>
           <a:p>
             <a:pPr marL="0" lvl="0" indent="0" algn="ctr" rtl="0">
@@ -34916,10 +34916,10 @@
               <a:buNone/>
             </a:pPr>
             <a:r>
-              <a:rPr lang="en-US" sz="1000"/>
+              <a:rPr lang="en-US" sz="1000" dirty="0"/>
               <a:t>(pipeline)</a:t>
             </a:r>
-            <a:endParaRPr sz="1000"/>
+            <a:endParaRPr sz="1000" dirty="0"/>
           </a:p>
         </p:txBody>
       </p:sp>
@@ -35119,7 +35119,7 @@
             </a:r>
             <a:r>
               <a:rPr lang="en-US" sz="1300" dirty="0"/>
-              <a:t>) can talk natively through the mapper to the BNG-u</a:t>
+              <a:t>) can talk natively through the mapper to the BNG-d</a:t>
             </a:r>
             <a:endParaRPr sz="1300" dirty="0"/>
           </a:p>
@@ -35629,7 +35629,7 @@
               <a:rPr lang="en-US"/>
               <a:t>8</a:t>
             </a:fld>
-            <a:endParaRPr/>
+            <a:endParaRPr dirty="0"/>
           </a:p>
         </p:txBody>
       </p:sp>
@@ -35684,10 +35684,10 @@
               <a:buNone/>
             </a:pPr>
             <a:r>
-              <a:rPr lang="en-US"/>
-              <a:t>BNG-u</a:t>
+              <a:rPr lang="en-US" dirty="0"/>
+              <a:t>BNG-d</a:t>
             </a:r>
-            <a:endParaRPr/>
+            <a:endParaRPr dirty="0"/>
           </a:p>
           <a:p>
             <a:pPr marL="0" lvl="0" indent="0" algn="ctr" rtl="0">
@@ -35700,10 +35700,10 @@
               <a:buNone/>
             </a:pPr>
             <a:r>
-              <a:rPr lang="en-US" sz="1000"/>
+              <a:rPr lang="en-US" sz="1000" dirty="0"/>
               <a:t>(pipeline)</a:t>
             </a:r>
-            <a:endParaRPr sz="1000"/>
+            <a:endParaRPr sz="1000" dirty="0"/>
           </a:p>
         </p:txBody>
       </p:sp>
@@ -35803,7 +35803,7 @@
             </a:pPr>
             <a:r>
               <a:rPr lang="en-US" sz="1300" dirty="0"/>
-              <a:t>DBNG-CP will communicate normally with the DBNG-UP-c using BBF interfaces (i.e. SCI, Pkt redirect &amp; </a:t>
+              <a:t>DBNG-CP will communicate normally with the DBNG-UP using BBF interfaces (i.e. SCI, Pkt redirect &amp; </a:t>
             </a:r>
             <a:r>
               <a:rPr lang="en-US" sz="1300" dirty="0" err="1"/>
@@ -35828,7 +35828,7 @@
             </a:pPr>
             <a:r>
               <a:rPr lang="en-US" sz="1300" dirty="0"/>
-              <a:t>DBNG-UP can then be split into a DBNG-UP-c that will communicate southbound with the BNG-u using the </a:t>
+              <a:t>DBNG-UP will communicate southbound with the BNG-d using the </a:t>
             </a:r>
             <a:r>
               <a:rPr lang="en-US" sz="1300" dirty="0" err="1"/>
@@ -35844,7 +35844,7 @@
             </a:r>
             <a:r>
               <a:rPr lang="en-US" sz="1300" dirty="0"/>
-              <a:t>)... similar to 5G UPF-c and UPF-u split</a:t>
+              <a:t>)... similar to 5G UPF-c and UPF-d split</a:t>
             </a:r>
             <a:endParaRPr sz="1300" dirty="0"/>
           </a:p>

</xml_diff>